<commit_message>
added jira report + ppt
</commit_message>
<xml_diff>
--- a/Automation.pptx
+++ b/Automation.pptx
@@ -5,7 +5,7 @@
     <p:sldMasterId id="2147483993" r:id="rId1"/>
   </p:sldMasterIdLst>
   <p:notesMasterIdLst>
-    <p:notesMasterId r:id="rId17"/>
+    <p:notesMasterId r:id="rId18"/>
   </p:notesMasterIdLst>
   <p:sldIdLst>
     <p:sldId id="256" r:id="rId2"/>
@@ -22,7 +22,8 @@
     <p:sldId id="269" r:id="rId13"/>
     <p:sldId id="270" r:id="rId14"/>
     <p:sldId id="271" r:id="rId15"/>
-    <p:sldId id="272" r:id="rId16"/>
+    <p:sldId id="273" r:id="rId16"/>
+    <p:sldId id="272" r:id="rId17"/>
   </p:sldIdLst>
   <p:sldSz cx="12192000" cy="6858000"/>
   <p:notesSz cx="6858000" cy="9144000"/>
@@ -148,6 +149,7 @@
             <p14:sldId id="269"/>
             <p14:sldId id="270"/>
             <p14:sldId id="271"/>
+            <p14:sldId id="273"/>
             <p14:sldId id="272"/>
           </p14:sldIdLst>
         </p14:section>
@@ -242,7 +244,7 @@
           <a:p>
             <a:fld id="{B45307F0-0303-9C4F-92BC-BF938E744BEC}" type="datetimeFigureOut">
               <a:rPr lang="en-US" smtClean="0"/>
-              <a:t>9/10/17</a:t>
+              <a:t>9/19/17</a:t>
             </a:fld>
             <a:endParaRPr lang="en-US"/>
           </a:p>
@@ -1424,7 +1426,7 @@
           <a:p>
             <a:fld id="{BBFC3B89-37DD-A34A-9FD8-C883714DDA7C}" type="datetimeFigureOut">
               <a:rPr lang="en-US" smtClean="0"/>
-              <a:t>9/10/17</a:t>
+              <a:t>9/19/17</a:t>
             </a:fld>
             <a:endParaRPr lang="en-US"/>
           </a:p>
@@ -1599,7 +1601,7 @@
           <a:p>
             <a:fld id="{BBFC3B89-37DD-A34A-9FD8-C883714DDA7C}" type="datetimeFigureOut">
               <a:rPr lang="en-US" smtClean="0"/>
-              <a:t>9/10/17</a:t>
+              <a:t>9/19/17</a:t>
             </a:fld>
             <a:endParaRPr lang="en-US"/>
           </a:p>
@@ -1775,7 +1777,7 @@
           <a:p>
             <a:fld id="{BBFC3B89-37DD-A34A-9FD8-C883714DDA7C}" type="datetimeFigureOut">
               <a:rPr lang="en-US" smtClean="0"/>
-              <a:t>9/10/17</a:t>
+              <a:t>9/19/17</a:t>
             </a:fld>
             <a:endParaRPr lang="en-US"/>
           </a:p>
@@ -1941,7 +1943,7 @@
           <a:p>
             <a:fld id="{BBFC3B89-37DD-A34A-9FD8-C883714DDA7C}" type="datetimeFigureOut">
               <a:rPr lang="en-US" smtClean="0"/>
-              <a:t>9/10/17</a:t>
+              <a:t>9/19/17</a:t>
             </a:fld>
             <a:endParaRPr lang="en-US"/>
           </a:p>
@@ -2258,7 +2260,7 @@
           <a:p>
             <a:fld id="{BBFC3B89-37DD-A34A-9FD8-C883714DDA7C}" type="datetimeFigureOut">
               <a:rPr lang="en-US" smtClean="0"/>
-              <a:t>9/10/17</a:t>
+              <a:t>9/19/17</a:t>
             </a:fld>
             <a:endParaRPr lang="en-US"/>
           </a:p>
@@ -2714,7 +2716,7 @@
           <a:p>
             <a:fld id="{BBFC3B89-37DD-A34A-9FD8-C883714DDA7C}" type="datetimeFigureOut">
               <a:rPr lang="en-US" smtClean="0"/>
-              <a:t>9/10/17</a:t>
+              <a:t>9/19/17</a:t>
             </a:fld>
             <a:endParaRPr lang="en-US"/>
           </a:p>
@@ -3121,7 +3123,7 @@
           <a:p>
             <a:fld id="{BBFC3B89-37DD-A34A-9FD8-C883714DDA7C}" type="datetimeFigureOut">
               <a:rPr lang="en-US" smtClean="0"/>
-              <a:t>9/10/17</a:t>
+              <a:t>9/19/17</a:t>
             </a:fld>
             <a:endParaRPr lang="en-US"/>
           </a:p>
@@ -3235,7 +3237,7 @@
           <a:p>
             <a:fld id="{BBFC3B89-37DD-A34A-9FD8-C883714DDA7C}" type="datetimeFigureOut">
               <a:rPr lang="en-US" smtClean="0"/>
-              <a:t>9/10/17</a:t>
+              <a:t>9/19/17</a:t>
             </a:fld>
             <a:endParaRPr lang="en-US"/>
           </a:p>
@@ -3349,7 +3351,7 @@
           <a:p>
             <a:fld id="{BBFC3B89-37DD-A34A-9FD8-C883714DDA7C}" type="datetimeFigureOut">
               <a:rPr lang="en-US" smtClean="0"/>
-              <a:t>9/10/17</a:t>
+              <a:t>9/19/17</a:t>
             </a:fld>
             <a:endParaRPr lang="en-US"/>
           </a:p>
@@ -3703,7 +3705,7 @@
           <a:p>
             <a:fld id="{BBFC3B89-37DD-A34A-9FD8-C883714DDA7C}" type="datetimeFigureOut">
               <a:rPr lang="en-US" smtClean="0"/>
-              <a:t>9/10/17</a:t>
+              <a:t>9/19/17</a:t>
             </a:fld>
             <a:endParaRPr lang="en-US"/>
           </a:p>
@@ -4206,7 +4208,7 @@
           <a:p>
             <a:fld id="{BBFC3B89-37DD-A34A-9FD8-C883714DDA7C}" type="datetimeFigureOut">
               <a:rPr lang="en-US" smtClean="0"/>
-              <a:t>9/10/17</a:t>
+              <a:t>9/19/17</a:t>
             </a:fld>
             <a:endParaRPr lang="en-US"/>
           </a:p>
@@ -4557,7 +4559,7 @@
           <a:p>
             <a:fld id="{BBFC3B89-37DD-A34A-9FD8-C883714DDA7C}" type="datetimeFigureOut">
               <a:rPr lang="en-US" smtClean="0"/>
-              <a:t>9/10/17</a:t>
+              <a:t>9/19/17</a:t>
             </a:fld>
             <a:endParaRPr lang="en-US"/>
           </a:p>
@@ -5784,7 +5786,7 @@
           <a:p>
             <a:r>
               <a:rPr lang="en-US" dirty="0" smtClean="0"/>
-              <a:t>Python script</a:t>
+              <a:t>Node/Python script</a:t>
             </a:r>
             <a:endParaRPr lang="en-US" dirty="0"/>
           </a:p>
@@ -5807,13 +5809,25 @@
           <a:p>
             <a:r>
               <a:rPr lang="en-US" dirty="0" smtClean="0"/>
-              <a:t>Python can do almost everything, from managing folder and files locally to ML</a:t>
-            </a:r>
-          </a:p>
-          <a:p>
-            <a:r>
-              <a:rPr lang="en-US" dirty="0" smtClean="0"/>
-              <a:t>Free and “easy to learn</a:t>
+              <a:t>Node/Python </a:t>
+            </a:r>
+            <a:r>
+              <a:rPr lang="en-US" dirty="0" smtClean="0"/>
+              <a:t>can do almost everything, from managing folder and files locally to ML</a:t>
+            </a:r>
+          </a:p>
+          <a:p>
+            <a:r>
+              <a:rPr lang="en-US" dirty="0" smtClean="0"/>
+              <a:t>Free and “</a:t>
+            </a:r>
+            <a:r>
+              <a:rPr lang="en-US" dirty="0" smtClean="0"/>
+              <a:t>easy” </a:t>
+            </a:r>
+            <a:r>
+              <a:rPr lang="en-US" dirty="0" smtClean="0"/>
+              <a:t>to learn</a:t>
             </a:r>
           </a:p>
           <a:p>
@@ -5981,6 +5995,239 @@
           <a:p>
             <a:r>
               <a:rPr lang="en-US" dirty="0" smtClean="0"/>
+              <a:t>Security</a:t>
+            </a:r>
+            <a:endParaRPr lang="en-US" dirty="0"/>
+          </a:p>
+        </p:txBody>
+      </p:sp>
+      <p:pic>
+        <p:nvPicPr>
+          <p:cNvPr id="10" name="Content Placeholder 9"/>
+          <p:cNvPicPr>
+            <a:picLocks noGrp="1" noChangeAspect="1"/>
+          </p:cNvPicPr>
+          <p:nvPr>
+            <p:ph sz="half" idx="1"/>
+          </p:nvPr>
+        </p:nvPicPr>
+        <p:blipFill>
+          <a:blip r:embed="rId2"/>
+          <a:stretch>
+            <a:fillRect/>
+          </a:stretch>
+        </p:blipFill>
+        <p:spPr>
+          <a:xfrm>
+            <a:off x="1069975" y="2628912"/>
+            <a:ext cx="4754563" cy="3108300"/>
+          </a:xfrm>
+          <a:prstGeom prst="rect">
+            <a:avLst/>
+          </a:prstGeom>
+        </p:spPr>
+      </p:pic>
+      <p:sp>
+        <p:nvSpPr>
+          <p:cNvPr id="6" name="Text Placeholder 5"/>
+          <p:cNvSpPr>
+            <a:spLocks noGrp="1"/>
+          </p:cNvSpPr>
+          <p:nvPr>
+            <p:ph sz="half" idx="2"/>
+          </p:nvPr>
+        </p:nvSpPr>
+        <p:spPr/>
+        <p:txBody>
+          <a:bodyPr>
+            <a:normAutofit fontScale="92500" lnSpcReduction="10000"/>
+          </a:bodyPr>
+          <a:lstStyle/>
+          <a:p>
+            <a:r>
+              <a:rPr lang="en-US" dirty="0" smtClean="0"/>
+              <a:t>Compliance certifications:</a:t>
+            </a:r>
+          </a:p>
+          <a:p>
+            <a:pPr lvl="1"/>
+            <a:r>
+              <a:rPr lang="en-US" dirty="0" smtClean="0"/>
+              <a:t>AWS </a:t>
+            </a:r>
+            <a:r>
+              <a:rPr lang="en-US" dirty="0" smtClean="0">
+                <a:sym typeface="Wingdings"/>
+              </a:rPr>
+              <a:t> </a:t>
+            </a:r>
+            <a:r>
+              <a:rPr lang="en-US" dirty="0" smtClean="0">
+                <a:hlinkClick r:id="rId3"/>
+              </a:rPr>
+              <a:t>https</a:t>
+            </a:r>
+            <a:r>
+              <a:rPr lang="en-US" dirty="0">
+                <a:hlinkClick r:id="rId3"/>
+              </a:rPr>
+              <a:t>://aws.amazon.com/compliance</a:t>
+            </a:r>
+            <a:r>
+              <a:rPr lang="en-US" dirty="0" smtClean="0">
+                <a:hlinkClick r:id="rId3"/>
+              </a:rPr>
+              <a:t>/</a:t>
+            </a:r>
+            <a:endParaRPr lang="en-US" dirty="0" smtClean="0"/>
+          </a:p>
+          <a:p>
+            <a:pPr lvl="1"/>
+            <a:r>
+              <a:rPr lang="en-US" dirty="0" smtClean="0"/>
+              <a:t>Google cloud </a:t>
+            </a:r>
+            <a:r>
+              <a:rPr lang="en-US" dirty="0">
+                <a:sym typeface="Wingdings"/>
+              </a:rPr>
+              <a:t> </a:t>
+            </a:r>
+            <a:r>
+              <a:rPr lang="en-US" dirty="0">
+                <a:sym typeface="Wingdings"/>
+                <a:hlinkClick r:id="rId4"/>
+              </a:rPr>
+              <a:t>https://</a:t>
+            </a:r>
+            <a:r>
+              <a:rPr lang="en-US" dirty="0" smtClean="0">
+                <a:sym typeface="Wingdings"/>
+                <a:hlinkClick r:id="rId4"/>
+              </a:rPr>
+              <a:t>cloud.google.com/security/compliance</a:t>
+            </a:r>
+            <a:endParaRPr lang="en-US" dirty="0" smtClean="0">
+              <a:sym typeface="Wingdings"/>
+            </a:endParaRPr>
+          </a:p>
+          <a:p>
+            <a:pPr lvl="1"/>
+            <a:r>
+              <a:rPr lang="en-US" dirty="0">
+                <a:sym typeface="Wingdings"/>
+              </a:rPr>
+              <a:t>Azure  </a:t>
+            </a:r>
+            <a:r>
+              <a:rPr lang="en-US" dirty="0">
+                <a:sym typeface="Wingdings"/>
+                <a:hlinkClick r:id="rId5"/>
+              </a:rPr>
+              <a:t>https://</a:t>
+            </a:r>
+            <a:r>
+              <a:rPr lang="en-US" dirty="0" smtClean="0">
+                <a:sym typeface="Wingdings"/>
+                <a:hlinkClick r:id="rId5"/>
+              </a:rPr>
+              <a:t>www.microsoft.com/en-us/trustcenter/compliance/complianceofferings</a:t>
+            </a:r>
+            <a:endParaRPr lang="en-US" dirty="0" smtClean="0">
+              <a:sym typeface="Wingdings"/>
+            </a:endParaRPr>
+          </a:p>
+          <a:p>
+            <a:r>
+              <a:rPr lang="en-US" dirty="0" smtClean="0"/>
+              <a:t>Regions:</a:t>
+            </a:r>
+          </a:p>
+          <a:p>
+            <a:pPr lvl="1"/>
+            <a:r>
+              <a:rPr lang="en-US" dirty="0" smtClean="0"/>
+              <a:t>UK, EU, USA, South America, </a:t>
+            </a:r>
+            <a:r>
+              <a:rPr lang="mr-IN" dirty="0" smtClean="0"/>
+              <a:t>…</a:t>
+            </a:r>
+            <a:endParaRPr lang="en-GB" dirty="0" smtClean="0"/>
+          </a:p>
+          <a:p>
+            <a:r>
+              <a:rPr lang="en-GB" dirty="0" smtClean="0"/>
+              <a:t>Disposable machines:</a:t>
+            </a:r>
+          </a:p>
+          <a:p>
+            <a:pPr lvl="1"/>
+            <a:r>
+              <a:rPr lang="en-GB" dirty="0" smtClean="0"/>
+              <a:t>Process and persist the data </a:t>
+            </a:r>
+            <a:r>
+              <a:rPr lang="en-GB" dirty="0" smtClean="0">
+                <a:sym typeface="Wingdings"/>
+              </a:rPr>
+              <a:t> </a:t>
+            </a:r>
+            <a:r>
+              <a:rPr lang="en-GB" dirty="0" smtClean="0"/>
+              <a:t>wipe the machine</a:t>
+            </a:r>
+            <a:endParaRPr lang="en-US" dirty="0"/>
+          </a:p>
+        </p:txBody>
+      </p:sp>
+    </p:spTree>
+    <p:extLst>
+      <p:ext uri="{BB962C8B-B14F-4D97-AF65-F5344CB8AC3E}">
+        <p14:creationId xmlns:p14="http://schemas.microsoft.com/office/powerpoint/2010/main" val="1807110907"/>
+      </p:ext>
+    </p:extLst>
+  </p:cSld>
+  <p:clrMapOvr>
+    <a:masterClrMapping/>
+  </p:clrMapOvr>
+</p:sld>
+</file>
+
+<file path=ppt/slides/slide16.xml><?xml version="1.0" encoding="utf-8"?>
+<p:sld xmlns:a="http://schemas.openxmlformats.org/drawingml/2006/main" xmlns:r="http://schemas.openxmlformats.org/officeDocument/2006/relationships" xmlns:p="http://schemas.openxmlformats.org/presentationml/2006/main">
+  <p:cSld>
+    <p:spTree>
+      <p:nvGrpSpPr>
+        <p:cNvPr id="1" name=""/>
+        <p:cNvGrpSpPr/>
+        <p:nvPr/>
+      </p:nvGrpSpPr>
+      <p:grpSpPr>
+        <a:xfrm>
+          <a:off x="0" y="0"/>
+          <a:ext cx="0" cy="0"/>
+          <a:chOff x="0" y="0"/>
+          <a:chExt cx="0" cy="0"/>
+        </a:xfrm>
+      </p:grpSpPr>
+      <p:sp>
+        <p:nvSpPr>
+          <p:cNvPr id="2" name="Title 1"/>
+          <p:cNvSpPr>
+            <a:spLocks noGrp="1"/>
+          </p:cNvSpPr>
+          <p:nvPr>
+            <p:ph type="title"/>
+          </p:nvPr>
+        </p:nvSpPr>
+        <p:spPr/>
+        <p:txBody>
+          <a:bodyPr/>
+          <a:lstStyle/>
+          <a:p>
+            <a:r>
+              <a:rPr lang="en-US" dirty="0" smtClean="0"/>
               <a:t>Future of Automation</a:t>
             </a:r>
             <a:endParaRPr lang="en-US" dirty="0"/>
@@ -6002,7 +6249,40 @@
           <a:bodyPr/>
           <a:lstStyle/>
           <a:p>
-            <a:endParaRPr lang="en-US" dirty="0"/>
+            <a:r>
+              <a:rPr lang="en-US" dirty="0" smtClean="0"/>
+              <a:t>Increase of event-base automation (software development is going to the same direction)</a:t>
+            </a:r>
+          </a:p>
+          <a:p>
+            <a:r>
+              <a:rPr lang="en-US" dirty="0" smtClean="0"/>
+              <a:t>Script languages like </a:t>
+            </a:r>
+            <a:r>
+              <a:rPr lang="en-US" dirty="0" err="1" smtClean="0"/>
+              <a:t>nodejs</a:t>
+            </a:r>
+            <a:r>
+              <a:rPr lang="en-US" dirty="0" smtClean="0"/>
+              <a:t> and python will get more popular</a:t>
+            </a:r>
+            <a:endParaRPr lang="en-US" dirty="0" smtClean="0"/>
+          </a:p>
+          <a:p>
+            <a:r>
+              <a:rPr lang="en-US" dirty="0" smtClean="0"/>
+              <a:t>More use of cloud providers</a:t>
+            </a:r>
+          </a:p>
+          <a:p>
+            <a:r>
+              <a:rPr lang="en-US" dirty="0" smtClean="0"/>
+              <a:t>More and better integrations</a:t>
+            </a:r>
+          </a:p>
+          <a:p>
+            <a:endParaRPr lang="en-US" dirty="0" smtClean="0"/>
           </a:p>
         </p:txBody>
       </p:sp>

</xml_diff>